<commit_message>
Taylor Swift texture mapping
</commit_message>
<xml_diff>
--- a/6028_Graph_1/D2D/W06a - texturing, part 1/Texture mapping maddness_Key_Ending_Slide.pptx
+++ b/6028_Graph_1/D2D/W06a - texturing, part 1/Texture mapping maddness_Key_Ending_Slide.pptx
@@ -220,7 +220,7 @@
             <a:fld id="{6E28E25E-87BB-46EA-8F9E-473DAE89420C}" type="datetimeFigureOut">
               <a:rPr lang="en-CA" smtClean="0"/>
               <a:pPr/>
-              <a:t>2023-10-19</a:t>
+              <a:t>2023-11-03</a:t>
             </a:fld>
             <a:endParaRPr lang="en-CA"/>
           </a:p>
@@ -486,7 +486,7 @@
             <a:fld id="{667A62CB-8588-4D98-8E9E-C665A03A0EA4}" type="datetimeFigureOut">
               <a:rPr lang="en-CA" smtClean="0"/>
               <a:pPr/>
-              <a:t>2023-10-19</a:t>
+              <a:t>2023-11-03</a:t>
             </a:fld>
             <a:endParaRPr lang="en-CA"/>
           </a:p>
@@ -653,7 +653,7 @@
             <a:fld id="{667A62CB-8588-4D98-8E9E-C665A03A0EA4}" type="datetimeFigureOut">
               <a:rPr lang="en-CA" smtClean="0"/>
               <a:pPr/>
-              <a:t>2023-10-19</a:t>
+              <a:t>2023-11-03</a:t>
             </a:fld>
             <a:endParaRPr lang="en-CA"/>
           </a:p>
@@ -830,7 +830,7 @@
             <a:fld id="{667A62CB-8588-4D98-8E9E-C665A03A0EA4}" type="datetimeFigureOut">
               <a:rPr lang="en-CA" smtClean="0"/>
               <a:pPr/>
-              <a:t>2023-10-19</a:t>
+              <a:t>2023-11-03</a:t>
             </a:fld>
             <a:endParaRPr lang="en-CA"/>
           </a:p>
@@ -997,7 +997,7 @@
             <a:fld id="{667A62CB-8588-4D98-8E9E-C665A03A0EA4}" type="datetimeFigureOut">
               <a:rPr lang="en-CA" smtClean="0"/>
               <a:pPr/>
-              <a:t>2023-10-19</a:t>
+              <a:t>2023-11-03</a:t>
             </a:fld>
             <a:endParaRPr lang="en-CA"/>
           </a:p>
@@ -1240,7 +1240,7 @@
             <a:fld id="{667A62CB-8588-4D98-8E9E-C665A03A0EA4}" type="datetimeFigureOut">
               <a:rPr lang="en-CA" smtClean="0"/>
               <a:pPr/>
-              <a:t>2023-10-19</a:t>
+              <a:t>2023-11-03</a:t>
             </a:fld>
             <a:endParaRPr lang="en-CA"/>
           </a:p>
@@ -1525,7 +1525,7 @@
             <a:fld id="{667A62CB-8588-4D98-8E9E-C665A03A0EA4}" type="datetimeFigureOut">
               <a:rPr lang="en-CA" smtClean="0"/>
               <a:pPr/>
-              <a:t>2023-10-19</a:t>
+              <a:t>2023-11-03</a:t>
             </a:fld>
             <a:endParaRPr lang="en-CA"/>
           </a:p>
@@ -1944,7 +1944,7 @@
             <a:fld id="{667A62CB-8588-4D98-8E9E-C665A03A0EA4}" type="datetimeFigureOut">
               <a:rPr lang="en-CA" smtClean="0"/>
               <a:pPr/>
-              <a:t>2023-10-19</a:t>
+              <a:t>2023-11-03</a:t>
             </a:fld>
             <a:endParaRPr lang="en-CA"/>
           </a:p>
@@ -2059,7 +2059,7 @@
             <a:fld id="{667A62CB-8588-4D98-8E9E-C665A03A0EA4}" type="datetimeFigureOut">
               <a:rPr lang="en-CA" smtClean="0"/>
               <a:pPr/>
-              <a:t>2023-10-19</a:t>
+              <a:t>2023-11-03</a:t>
             </a:fld>
             <a:endParaRPr lang="en-CA"/>
           </a:p>
@@ -2151,7 +2151,7 @@
             <a:fld id="{667A62CB-8588-4D98-8E9E-C665A03A0EA4}" type="datetimeFigureOut">
               <a:rPr lang="en-CA" smtClean="0"/>
               <a:pPr/>
-              <a:t>2023-10-19</a:t>
+              <a:t>2023-11-03</a:t>
             </a:fld>
             <a:endParaRPr lang="en-CA"/>
           </a:p>
@@ -2425,7 +2425,7 @@
             <a:fld id="{667A62CB-8588-4D98-8E9E-C665A03A0EA4}" type="datetimeFigureOut">
               <a:rPr lang="en-CA" smtClean="0"/>
               <a:pPr/>
-              <a:t>2023-10-19</a:t>
+              <a:t>2023-11-03</a:t>
             </a:fld>
             <a:endParaRPr lang="en-CA"/>
           </a:p>
@@ -2675,7 +2675,7 @@
             <a:fld id="{667A62CB-8588-4D98-8E9E-C665A03A0EA4}" type="datetimeFigureOut">
               <a:rPr lang="en-CA" smtClean="0"/>
               <a:pPr/>
-              <a:t>2023-10-19</a:t>
+              <a:t>2023-11-03</a:t>
             </a:fld>
             <a:endParaRPr lang="en-CA"/>
           </a:p>
@@ -2885,7 +2885,7 @@
             <a:fld id="{667A62CB-8588-4D98-8E9E-C665A03A0EA4}" type="datetimeFigureOut">
               <a:rPr lang="en-CA" smtClean="0"/>
               <a:pPr/>
-              <a:t>2023-10-19</a:t>
+              <a:t>2023-11-03</a:t>
             </a:fld>
             <a:endParaRPr lang="en-CA"/>
           </a:p>
@@ -3716,8 +3716,8 @@
         </p:nvSpPr>
         <p:spPr>
           <a:xfrm>
-            <a:off x="5143500" y="2384425"/>
-            <a:ext cx="838200" cy="488950"/>
+            <a:off x="5067300" y="2384425"/>
+            <a:ext cx="1676400" cy="488950"/>
           </a:xfrm>
           <a:prstGeom prst="ellipse">
             <a:avLst/>
@@ -3745,7 +3745,7 @@
           <a:p>
             <a:pPr algn="ctr"/>
             <a:r>
-              <a:rPr lang="en-CA" sz="2800" dirty="0"/>
+              <a:rPr lang="en-CA" sz="2400" dirty="0"/>
               <a:t>0,0</a:t>
             </a:r>
           </a:p>
@@ -4444,6 +4444,47 @@
             <a:r>
               <a:rPr lang="en-CA" sz="3600" dirty="0"/>
               <a:t>RGBA</a:t>
+            </a:r>
+          </a:p>
+        </p:txBody>
+      </p:sp>
+      <p:sp>
+        <p:nvSpPr>
+          <p:cNvPr id="2" name="TextBox 1">
+            <a:extLst>
+              <a:ext uri="{FF2B5EF4-FFF2-40B4-BE49-F238E27FC236}">
+                <a16:creationId xmlns:a16="http://schemas.microsoft.com/office/drawing/2014/main" id="{CEFC0B35-C030-52EE-B27C-B983E988CD53}"/>
+              </a:ext>
+            </a:extLst>
+          </p:cNvPr>
+          <p:cNvSpPr txBox="1"/>
+          <p:nvPr/>
+        </p:nvSpPr>
+        <p:spPr>
+          <a:xfrm>
+            <a:off x="952500" y="4217615"/>
+            <a:ext cx="2743200" cy="646331"/>
+          </a:xfrm>
+          <a:prstGeom prst="rect">
+            <a:avLst/>
+          </a:prstGeom>
+          <a:noFill/>
+        </p:spPr>
+        <p:txBody>
+          <a:bodyPr wrap="square" rtlCol="0">
+            <a:spAutoFit/>
+          </a:bodyPr>
+          <a:lstStyle/>
+          <a:p>
+            <a:r>
+              <a:rPr lang="en-CA" dirty="0"/>
+              <a:t>OpenGL: s(x), t(y), u(z)</a:t>
+            </a:r>
+          </a:p>
+          <a:p>
+            <a:r>
+              <a:rPr lang="en-CA" dirty="0"/>
+              <a:t>DirectX: u(x), v(y), w(z)</a:t>
             </a:r>
           </a:p>
         </p:txBody>
@@ -5590,7 +5631,7 @@
             <a:pPr algn="ctr"/>
             <a:r>
               <a:rPr lang="en-CA" dirty="0"/>
-              <a:t>Sophie T Texture in </a:t>
+              <a:t>Taylor Swift Texture in </a:t>
             </a:r>
             <a:r>
               <a:rPr lang="en-CA" b="1" dirty="0"/>
@@ -5822,6 +5863,7 @@
         <p:nvCxnSpPr>
           <p:cNvPr id="24" name="Straight Arrow Connector 23"/>
           <p:cNvCxnSpPr>
+            <a:cxnSpLocks/>
             <a:stCxn id="9" idx="3"/>
             <a:endCxn id="14" idx="1"/>
           </p:cNvCxnSpPr>
@@ -5983,8 +6025,12 @@
           <a:p>
             <a:pPr algn="ctr"/>
             <a:r>
+              <a:rPr lang="en-CA" dirty="0" err="1"/>
+              <a:t>TaylorSwift</a:t>
+            </a:r>
+            <a:r>
               <a:rPr lang="en-CA" dirty="0"/>
-              <a:t>Justin  T </a:t>
+              <a:t> </a:t>
             </a:r>
             <a:r>
               <a:rPr lang="en-CA" b="1" dirty="0"/>
@@ -8702,7 +8748,7 @@
         <p:spPr>
           <a:xfrm>
             <a:off x="152400" y="361950"/>
-            <a:ext cx="1676400" cy="1295400"/>
+            <a:ext cx="1676400" cy="723900"/>
           </a:xfrm>
           <a:prstGeom prst="rect">
             <a:avLst/>
@@ -8728,29 +8774,34 @@
           <a:p>
             <a:pPr algn="ctr"/>
             <a:r>
-              <a:rPr lang="en-CA" i="1" dirty="0"/>
-              <a:t>Grass</a:t>
-            </a:r>
-          </a:p>
-          <a:p>
-            <a:pPr algn="ctr"/>
-            <a:r>
-              <a:rPr lang="en-CA" dirty="0"/>
+              <a:rPr lang="en-CA" sz="1200" i="1" dirty="0"/>
+              <a:t>Taylor </a:t>
+            </a:r>
+            <a:r>
+              <a:rPr lang="en-CA" sz="1200" i="1" dirty="0" err="1"/>
+              <a:t>Switft</a:t>
+            </a:r>
+            <a:endParaRPr lang="en-CA" sz="1200" i="1" dirty="0"/>
+          </a:p>
+          <a:p>
+            <a:pPr algn="ctr"/>
+            <a:r>
+              <a:rPr lang="en-CA" sz="1200" dirty="0"/>
               <a:t> Texture in </a:t>
             </a:r>
             <a:r>
-              <a:rPr lang="en-CA" b="1" dirty="0"/>
+              <a:rPr lang="en-CA" sz="1200" b="1" dirty="0"/>
               <a:t>GPU</a:t>
             </a:r>
             <a:r>
-              <a:rPr lang="en-CA" dirty="0"/>
+              <a:rPr lang="en-CA" sz="1200" dirty="0"/>
               <a:t> RAM: </a:t>
             </a:r>
           </a:p>
           <a:p>
             <a:pPr algn="ctr"/>
             <a:r>
-              <a:rPr lang="en-CA" dirty="0"/>
+              <a:rPr lang="en-CA" sz="1200" dirty="0"/>
               <a:t>1</a:t>
             </a:r>
           </a:p>
@@ -8764,8 +8815,8 @@
         </p:nvSpPr>
         <p:spPr>
           <a:xfrm>
-            <a:off x="5257800" y="876300"/>
-            <a:ext cx="1219200" cy="457200"/>
+            <a:off x="5029200" y="876300"/>
+            <a:ext cx="1447800" cy="457200"/>
           </a:xfrm>
           <a:prstGeom prst="rect">
             <a:avLst/>
@@ -8794,7 +8845,7 @@
             <a:pPr algn="ctr"/>
             <a:r>
               <a:rPr lang="en-CA" dirty="0"/>
-              <a:t>Sampler0</a:t>
+              <a:t>Sampler0: texture_00</a:t>
             </a:r>
           </a:p>
         </p:txBody>
@@ -8844,54 +8895,16 @@
       </p:sp>
       <p:cxnSp>
         <p:nvCxnSpPr>
-          <p:cNvPr id="21" name="Straight Arrow Connector 20"/>
-          <p:cNvCxnSpPr>
-            <a:cxnSpLocks/>
-            <a:endCxn id="14" idx="3"/>
-          </p:cNvCxnSpPr>
-          <p:nvPr/>
-        </p:nvCxnSpPr>
-        <p:spPr>
-          <a:xfrm flipH="1" flipV="1">
-            <a:off x="4343400" y="1085850"/>
-            <a:ext cx="914400" cy="800100"/>
-          </a:xfrm>
-          <a:prstGeom prst="straightConnector1">
-            <a:avLst/>
-          </a:prstGeom>
-          <a:ln>
-            <a:tailEnd type="arrow"/>
-          </a:ln>
-        </p:spPr>
-        <p:style>
-          <a:lnRef idx="3">
-            <a:schemeClr val="accent6"/>
-          </a:lnRef>
-          <a:fillRef idx="0">
-            <a:schemeClr val="accent6"/>
-          </a:fillRef>
-          <a:effectRef idx="2">
-            <a:schemeClr val="accent6"/>
-          </a:effectRef>
-          <a:fontRef idx="minor">
-            <a:schemeClr val="tx1"/>
-          </a:fontRef>
-        </p:style>
-      </p:cxnSp>
-      <p:cxnSp>
-        <p:nvCxnSpPr>
           <p:cNvPr id="24" name="Straight Arrow Connector 23"/>
           <p:cNvCxnSpPr>
             <a:cxnSpLocks/>
-            <a:stCxn id="17" idx="3"/>
-            <a:endCxn id="16" idx="1"/>
           </p:cNvCxnSpPr>
           <p:nvPr/>
         </p:nvCxnSpPr>
         <p:spPr>
-          <a:xfrm flipV="1">
-            <a:off x="1828800" y="2457450"/>
-            <a:ext cx="609600" cy="76200"/>
+          <a:xfrm>
+            <a:off x="7924800" y="3737264"/>
+            <a:ext cx="609600" cy="838200"/>
           </a:xfrm>
           <a:prstGeom prst="straightConnector1">
             <a:avLst/>
@@ -9009,8 +9022,8 @@
         </p:nvSpPr>
         <p:spPr>
           <a:xfrm>
-            <a:off x="152400" y="1885950"/>
-            <a:ext cx="1676400" cy="1295400"/>
+            <a:off x="152400" y="1238250"/>
+            <a:ext cx="1676400" cy="762000"/>
           </a:xfrm>
           <a:prstGeom prst="rect">
             <a:avLst/>
@@ -9036,29 +9049,29 @@
           <a:p>
             <a:pPr algn="ctr"/>
             <a:r>
-              <a:rPr lang="en-CA" i="1" dirty="0"/>
+              <a:rPr lang="en-CA" sz="1200" i="1" dirty="0"/>
               <a:t>Brick </a:t>
             </a:r>
           </a:p>
           <a:p>
             <a:pPr algn="ctr"/>
             <a:r>
-              <a:rPr lang="en-CA" dirty="0"/>
+              <a:rPr lang="en-CA" sz="1200" dirty="0"/>
               <a:t>Texture in </a:t>
             </a:r>
             <a:r>
-              <a:rPr lang="en-CA" b="1" dirty="0"/>
+              <a:rPr lang="en-CA" sz="1200" b="1" dirty="0"/>
               <a:t>GPU</a:t>
             </a:r>
             <a:r>
-              <a:rPr lang="en-CA" dirty="0"/>
+              <a:rPr lang="en-CA" sz="1200" dirty="0"/>
               <a:t> RAM: </a:t>
             </a:r>
           </a:p>
           <a:p>
             <a:pPr algn="ctr"/>
             <a:r>
-              <a:rPr lang="en-CA" dirty="0"/>
+              <a:rPr lang="en-CA" sz="1200" dirty="0"/>
               <a:t>2</a:t>
             </a:r>
           </a:p>
@@ -9072,8 +9085,8 @@
         </p:nvSpPr>
         <p:spPr>
           <a:xfrm>
-            <a:off x="152400" y="3333750"/>
-            <a:ext cx="1676400" cy="1295400"/>
+            <a:off x="110836" y="2152650"/>
+            <a:ext cx="1676400" cy="723900"/>
           </a:xfrm>
           <a:prstGeom prst="rect">
             <a:avLst/>
@@ -9099,29 +9112,29 @@
           <a:p>
             <a:pPr algn="ctr"/>
             <a:r>
-              <a:rPr lang="en-CA" i="1" dirty="0"/>
+              <a:rPr lang="en-CA" sz="1200" i="1" dirty="0"/>
               <a:t>Justin</a:t>
             </a:r>
           </a:p>
           <a:p>
             <a:pPr algn="ctr"/>
             <a:r>
-              <a:rPr lang="en-CA" dirty="0"/>
+              <a:rPr lang="en-CA" sz="1200" dirty="0"/>
               <a:t>Texture in </a:t>
             </a:r>
             <a:r>
-              <a:rPr lang="en-CA" b="1" dirty="0"/>
+              <a:rPr lang="en-CA" sz="1200" b="1" dirty="0"/>
               <a:t>GPU</a:t>
             </a:r>
             <a:r>
-              <a:rPr lang="en-CA" dirty="0"/>
+              <a:rPr lang="en-CA" sz="1200" dirty="0"/>
               <a:t> RAM: </a:t>
             </a:r>
           </a:p>
           <a:p>
             <a:pPr algn="ctr"/>
             <a:r>
-              <a:rPr lang="en-CA" dirty="0"/>
+              <a:rPr lang="en-CA" sz="1200" dirty="0"/>
               <a:t>3</a:t>
             </a:r>
           </a:p>
@@ -9135,8 +9148,8 @@
         </p:nvSpPr>
         <p:spPr>
           <a:xfrm>
-            <a:off x="5257800" y="1657350"/>
-            <a:ext cx="1219200" cy="457200"/>
+            <a:off x="5029200" y="1657350"/>
+            <a:ext cx="1447800" cy="457200"/>
           </a:xfrm>
           <a:prstGeom prst="rect">
             <a:avLst/>
@@ -9178,8 +9191,8 @@
         </p:nvSpPr>
         <p:spPr>
           <a:xfrm>
-            <a:off x="5257800" y="2419350"/>
-            <a:ext cx="1219200" cy="457200"/>
+            <a:off x="4994564" y="2419350"/>
+            <a:ext cx="1482436" cy="457200"/>
           </a:xfrm>
           <a:prstGeom prst="rect">
             <a:avLst/>
@@ -9411,14 +9424,15 @@
           <p:cNvPr id="28" name="Straight Arrow Connector 27"/>
           <p:cNvCxnSpPr>
             <a:cxnSpLocks/>
-            <a:endCxn id="14" idx="1"/>
+            <a:stCxn id="33" idx="1"/>
+            <a:endCxn id="9" idx="3"/>
           </p:cNvCxnSpPr>
           <p:nvPr/>
         </p:nvCxnSpPr>
         <p:spPr>
-          <a:xfrm>
-            <a:off x="1828800" y="971550"/>
-            <a:ext cx="609600" cy="114300"/>
+          <a:xfrm flipH="1" flipV="1">
+            <a:off x="1828800" y="723900"/>
+            <a:ext cx="533401" cy="3943350"/>
           </a:xfrm>
           <a:prstGeom prst="straightConnector1">
             <a:avLst/>
@@ -9447,14 +9461,12 @@
           <p:cNvPr id="34" name="Straight Arrow Connector 33"/>
           <p:cNvCxnSpPr>
             <a:cxnSpLocks/>
-            <a:stCxn id="32" idx="1"/>
-            <a:endCxn id="16" idx="3"/>
           </p:cNvCxnSpPr>
           <p:nvPr/>
         </p:nvCxnSpPr>
         <p:spPr>
           <a:xfrm flipH="1" flipV="1">
-            <a:off x="4343400" y="2457450"/>
+            <a:off x="8097982" y="4397087"/>
             <a:ext cx="914400" cy="190500"/>
           </a:xfrm>
           <a:prstGeom prst="straightConnector1">
@@ -9490,15 +9502,13 @@
           </p:cNvPr>
           <p:cNvCxnSpPr>
             <a:cxnSpLocks/>
-            <a:stCxn id="22" idx="3"/>
-            <a:endCxn id="15" idx="1"/>
           </p:cNvCxnSpPr>
           <p:nvPr/>
         </p:nvCxnSpPr>
         <p:spPr>
           <a:xfrm flipV="1">
-            <a:off x="1828800" y="1771650"/>
-            <a:ext cx="609600" cy="2209800"/>
+            <a:off x="8229600" y="4003964"/>
+            <a:ext cx="651164" cy="742950"/>
           </a:xfrm>
           <a:prstGeom prst="straightConnector1">
             <a:avLst/>
@@ -9541,7 +9551,7 @@
         <p:spPr>
           <a:xfrm flipH="1">
             <a:off x="4343400" y="1104900"/>
-            <a:ext cx="914400" cy="666750"/>
+            <a:ext cx="685800" cy="666750"/>
           </a:xfrm>
           <a:prstGeom prst="straightConnector1">
             <a:avLst/>
@@ -9565,6 +9575,271 @@
           </a:fontRef>
         </p:style>
       </p:cxnSp>
+      <p:sp>
+        <p:nvSpPr>
+          <p:cNvPr id="10" name="Rectangle 9">
+            <a:extLst>
+              <a:ext uri="{FF2B5EF4-FFF2-40B4-BE49-F238E27FC236}">
+                <a16:creationId xmlns:a16="http://schemas.microsoft.com/office/drawing/2014/main" id="{711147C8-508C-42B9-8BCC-802B0B2B2DCB}"/>
+              </a:ext>
+            </a:extLst>
+          </p:cNvPr>
+          <p:cNvSpPr/>
+          <p:nvPr/>
+        </p:nvSpPr>
+        <p:spPr>
+          <a:xfrm>
+            <a:off x="110836" y="3013364"/>
+            <a:ext cx="1676400" cy="723900"/>
+          </a:xfrm>
+          <a:prstGeom prst="rect">
+            <a:avLst/>
+          </a:prstGeom>
+        </p:spPr>
+        <p:style>
+          <a:lnRef idx="3">
+            <a:schemeClr val="lt1"/>
+          </a:lnRef>
+          <a:fillRef idx="1">
+            <a:schemeClr val="accent4"/>
+          </a:fillRef>
+          <a:effectRef idx="1">
+            <a:schemeClr val="accent4"/>
+          </a:effectRef>
+          <a:fontRef idx="minor">
+            <a:schemeClr val="lt1"/>
+          </a:fontRef>
+        </p:style>
+        <p:txBody>
+          <a:bodyPr rtlCol="0" anchor="ctr"/>
+          <a:lstStyle/>
+          <a:p>
+            <a:pPr algn="ctr"/>
+            <a:endParaRPr lang="en-CA" sz="1200" i="1" dirty="0"/>
+          </a:p>
+          <a:p>
+            <a:pPr algn="ctr"/>
+            <a:r>
+              <a:rPr lang="en-CA" sz="1200" dirty="0"/>
+              <a:t>Texture in </a:t>
+            </a:r>
+            <a:r>
+              <a:rPr lang="en-CA" sz="1200" b="1" dirty="0"/>
+              <a:t>GPU</a:t>
+            </a:r>
+            <a:r>
+              <a:rPr lang="en-CA" sz="1200" dirty="0"/>
+              <a:t> RAM: </a:t>
+            </a:r>
+          </a:p>
+        </p:txBody>
+      </p:sp>
+      <p:sp>
+        <p:nvSpPr>
+          <p:cNvPr id="11" name="Rectangle 10">
+            <a:extLst>
+              <a:ext uri="{FF2B5EF4-FFF2-40B4-BE49-F238E27FC236}">
+                <a16:creationId xmlns:a16="http://schemas.microsoft.com/office/drawing/2014/main" id="{081C7191-BA14-BDF3-B214-61B4052764A8}"/>
+              </a:ext>
+            </a:extLst>
+          </p:cNvPr>
+          <p:cNvSpPr/>
+          <p:nvPr/>
+        </p:nvSpPr>
+        <p:spPr>
+          <a:xfrm>
+            <a:off x="110836" y="3943350"/>
+            <a:ext cx="1676400" cy="723900"/>
+          </a:xfrm>
+          <a:prstGeom prst="rect">
+            <a:avLst/>
+          </a:prstGeom>
+        </p:spPr>
+        <p:style>
+          <a:lnRef idx="3">
+            <a:schemeClr val="lt1"/>
+          </a:lnRef>
+          <a:fillRef idx="1">
+            <a:schemeClr val="accent4"/>
+          </a:fillRef>
+          <a:effectRef idx="1">
+            <a:schemeClr val="accent4"/>
+          </a:effectRef>
+          <a:fontRef idx="minor">
+            <a:schemeClr val="lt1"/>
+          </a:fontRef>
+        </p:style>
+        <p:txBody>
+          <a:bodyPr rtlCol="0" anchor="ctr"/>
+          <a:lstStyle/>
+          <a:p>
+            <a:pPr algn="ctr"/>
+            <a:endParaRPr lang="en-CA" sz="1200" i="1" dirty="0"/>
+          </a:p>
+          <a:p>
+            <a:pPr algn="ctr"/>
+            <a:r>
+              <a:rPr lang="en-CA" sz="1200" dirty="0"/>
+              <a:t>Texture in </a:t>
+            </a:r>
+            <a:r>
+              <a:rPr lang="en-CA" sz="1200" b="1" dirty="0"/>
+              <a:t>GPU</a:t>
+            </a:r>
+            <a:r>
+              <a:rPr lang="en-CA" sz="1200" dirty="0"/>
+              <a:t> RAM: </a:t>
+            </a:r>
+          </a:p>
+        </p:txBody>
+      </p:sp>
+      <p:sp>
+        <p:nvSpPr>
+          <p:cNvPr id="29" name="Rounded Rectangle 15">
+            <a:extLst>
+              <a:ext uri="{FF2B5EF4-FFF2-40B4-BE49-F238E27FC236}">
+                <a16:creationId xmlns:a16="http://schemas.microsoft.com/office/drawing/2014/main" id="{CEC596B0-9EB9-8731-6504-8C1075426ED9}"/>
+              </a:ext>
+            </a:extLst>
+          </p:cNvPr>
+          <p:cNvSpPr/>
+          <p:nvPr/>
+        </p:nvSpPr>
+        <p:spPr>
+          <a:xfrm>
+            <a:off x="2400300" y="2962275"/>
+            <a:ext cx="1905000" cy="533400"/>
+          </a:xfrm>
+          <a:prstGeom prst="roundRect">
+            <a:avLst/>
+          </a:prstGeom>
+        </p:spPr>
+        <p:style>
+          <a:lnRef idx="2">
+            <a:schemeClr val="accent5">
+              <a:shade val="50000"/>
+            </a:schemeClr>
+          </a:lnRef>
+          <a:fillRef idx="1">
+            <a:schemeClr val="accent5"/>
+          </a:fillRef>
+          <a:effectRef idx="0">
+            <a:schemeClr val="accent5"/>
+          </a:effectRef>
+          <a:fontRef idx="minor">
+            <a:schemeClr val="lt1"/>
+          </a:fontRef>
+        </p:style>
+        <p:txBody>
+          <a:bodyPr rtlCol="0" anchor="ctr"/>
+          <a:lstStyle/>
+          <a:p>
+            <a:pPr algn="ctr"/>
+            <a:r>
+              <a:rPr lang="en-CA" dirty="0"/>
+              <a:t>GL_TEXTURE3</a:t>
+            </a:r>
+          </a:p>
+        </p:txBody>
+      </p:sp>
+      <p:sp>
+        <p:nvSpPr>
+          <p:cNvPr id="30" name="Rounded Rectangle 15">
+            <a:extLst>
+              <a:ext uri="{FF2B5EF4-FFF2-40B4-BE49-F238E27FC236}">
+                <a16:creationId xmlns:a16="http://schemas.microsoft.com/office/drawing/2014/main" id="{8CBE1FA9-15AE-F31D-77B6-CDECC1475592}"/>
+              </a:ext>
+            </a:extLst>
+          </p:cNvPr>
+          <p:cNvSpPr/>
+          <p:nvPr/>
+        </p:nvSpPr>
+        <p:spPr>
+          <a:xfrm>
+            <a:off x="2379518" y="3676650"/>
+            <a:ext cx="1905000" cy="533400"/>
+          </a:xfrm>
+          <a:prstGeom prst="roundRect">
+            <a:avLst/>
+          </a:prstGeom>
+        </p:spPr>
+        <p:style>
+          <a:lnRef idx="2">
+            <a:schemeClr val="accent5">
+              <a:shade val="50000"/>
+            </a:schemeClr>
+          </a:lnRef>
+          <a:fillRef idx="1">
+            <a:schemeClr val="accent5"/>
+          </a:fillRef>
+          <a:effectRef idx="0">
+            <a:schemeClr val="accent5"/>
+          </a:effectRef>
+          <a:fontRef idx="minor">
+            <a:schemeClr val="lt1"/>
+          </a:fontRef>
+        </p:style>
+        <p:txBody>
+          <a:bodyPr rtlCol="0" anchor="ctr"/>
+          <a:lstStyle/>
+          <a:p>
+            <a:pPr algn="ctr"/>
+            <a:r>
+              <a:rPr lang="en-CA" dirty="0"/>
+              <a:t>GL_TEXTURE4</a:t>
+            </a:r>
+          </a:p>
+        </p:txBody>
+      </p:sp>
+      <p:sp>
+        <p:nvSpPr>
+          <p:cNvPr id="33" name="Rounded Rectangle 15">
+            <a:extLst>
+              <a:ext uri="{FF2B5EF4-FFF2-40B4-BE49-F238E27FC236}">
+                <a16:creationId xmlns:a16="http://schemas.microsoft.com/office/drawing/2014/main" id="{42D8CA3A-AA07-BCDC-DF6E-CD642543BEB9}"/>
+              </a:ext>
+            </a:extLst>
+          </p:cNvPr>
+          <p:cNvSpPr/>
+          <p:nvPr/>
+        </p:nvSpPr>
+        <p:spPr>
+          <a:xfrm>
+            <a:off x="2362201" y="4400550"/>
+            <a:ext cx="1905000" cy="533400"/>
+          </a:xfrm>
+          <a:prstGeom prst="roundRect">
+            <a:avLst/>
+          </a:prstGeom>
+        </p:spPr>
+        <p:style>
+          <a:lnRef idx="2">
+            <a:schemeClr val="accent5">
+              <a:shade val="50000"/>
+            </a:schemeClr>
+          </a:lnRef>
+          <a:fillRef idx="1">
+            <a:schemeClr val="accent5"/>
+          </a:fillRef>
+          <a:effectRef idx="0">
+            <a:schemeClr val="accent5"/>
+          </a:effectRef>
+          <a:fontRef idx="minor">
+            <a:schemeClr val="lt1"/>
+          </a:fontRef>
+        </p:style>
+        <p:txBody>
+          <a:bodyPr rtlCol="0" anchor="ctr"/>
+          <a:lstStyle/>
+          <a:p>
+            <a:pPr algn="ctr"/>
+            <a:r>
+              <a:rPr lang="en-CA" dirty="0"/>
+              <a:t>GL_TEXTURE5</a:t>
+            </a:r>
+          </a:p>
+        </p:txBody>
+      </p:sp>
     </p:spTree>
   </p:cSld>
   <p:clrMapOvr>

</xml_diff>